<commit_message>
Une seule image de carte Uom APSFR
</commit_message>
<xml_diff>
--- a/standard/ressources/Uom-APSFR.pptx
+++ b/standard/ressources/Uom-APSFR.pptx
@@ -104,6 +104,11 @@
       </a:defRPr>
     </a:lvl9pPr>
   </p:defaultTextStyle>
+  <p:extLst>
+    <p:ext uri="{EFAFB233-063F-42B5-8137-9DF3F51BA10A}">
+      <p15:sldGuideLst xmlns:p15="http://schemas.microsoft.com/office/powerpoint/2012/main"/>
+    </p:ext>
+  </p:extLst>
 </p:presentation>
 </file>
 
@@ -3824,18 +3829,18 @@
         </p:nvGrpSpPr>
         <p:grpSpPr>
           <a:xfrm>
-            <a:off x="136778" y="338441"/>
-            <a:ext cx="2472484" cy="6213755"/>
-            <a:chOff x="201527" y="338441"/>
-            <a:chExt cx="2472484" cy="6213755"/>
+            <a:off x="487936" y="341860"/>
+            <a:ext cx="2459222" cy="6288369"/>
+            <a:chOff x="552685" y="341860"/>
+            <a:chExt cx="2459222" cy="6288369"/>
           </a:xfrm>
         </p:grpSpPr>
         <p:pic>
           <p:nvPicPr>
-            <p:cNvPr id="15" name="Image 14">
+            <p:cNvPr id="16" name="Image 15">
               <a:extLst>
                 <a:ext uri="{FF2B5EF4-FFF2-40B4-BE49-F238E27FC236}">
-                  <a16:creationId xmlns:a16="http://schemas.microsoft.com/office/drawing/2014/main" id="{12078015-9674-4591-ACFD-9841696BCD2D}"/>
+                  <a16:creationId xmlns:a16="http://schemas.microsoft.com/office/drawing/2014/main" id="{18F78132-C23C-4D00-B955-37E19EAD1C9B}"/>
                 </a:ext>
               </a:extLst>
             </p:cNvPr>
@@ -3858,20 +3863,27 @@
           </p:blipFill>
           <p:spPr>
             <a:xfrm>
-              <a:off x="201527" y="338441"/>
-              <a:ext cx="2234058" cy="1718937"/>
+              <a:off x="552685" y="3928251"/>
+              <a:ext cx="2459222" cy="2701978"/>
             </a:xfrm>
             <a:prstGeom prst="rect">
               <a:avLst/>
             </a:prstGeom>
+            <a:ln>
+              <a:solidFill>
+                <a:schemeClr val="tx2">
+                  <a:lumMod val="75000"/>
+                </a:schemeClr>
+              </a:solidFill>
+            </a:ln>
           </p:spPr>
         </p:pic>
         <p:pic>
           <p:nvPicPr>
-            <p:cNvPr id="16" name="Image 15">
+            <p:cNvPr id="17" name="Image 16">
               <a:extLst>
                 <a:ext uri="{FF2B5EF4-FFF2-40B4-BE49-F238E27FC236}">
-                  <a16:creationId xmlns:a16="http://schemas.microsoft.com/office/drawing/2014/main" id="{18F78132-C23C-4D00-B955-37E19EAD1C9B}"/>
+                  <a16:creationId xmlns:a16="http://schemas.microsoft.com/office/drawing/2014/main" id="{86A77DAB-D687-4CB4-B96E-7AC90494C980}"/>
                 </a:ext>
               </a:extLst>
             </p:cNvPr>
@@ -3894,98 +3906,21 @@
           </p:blipFill>
           <p:spPr>
             <a:xfrm>
-              <a:off x="214789" y="3850218"/>
-              <a:ext cx="2459222" cy="2701978"/>
-            </a:xfrm>
-            <a:prstGeom prst="rect">
-              <a:avLst/>
-            </a:prstGeom>
-          </p:spPr>
-        </p:pic>
-        <p:pic>
-          <p:nvPicPr>
-            <p:cNvPr id="17" name="Image 16">
-              <a:extLst>
-                <a:ext uri="{FF2B5EF4-FFF2-40B4-BE49-F238E27FC236}">
-                  <a16:creationId xmlns:a16="http://schemas.microsoft.com/office/drawing/2014/main" id="{86A77DAB-D687-4CB4-B96E-7AC90494C980}"/>
-                </a:ext>
-              </a:extLst>
-            </p:cNvPr>
-            <p:cNvPicPr>
-              <a:picLocks noChangeAspect="1"/>
-            </p:cNvPicPr>
-            <p:nvPr/>
-          </p:nvPicPr>
-          <p:blipFill>
-            <a:blip r:embed="rId5">
-              <a:extLst>
-                <a:ext uri="{28A0092B-C50C-407E-A947-70E740481C1C}">
-                  <a14:useLocalDpi xmlns:a14="http://schemas.microsoft.com/office/drawing/2010/main" val="0"/>
-                </a:ext>
-              </a:extLst>
-            </a:blip>
-            <a:stretch>
-              <a:fillRect/>
-            </a:stretch>
-          </p:blipFill>
-          <p:spPr>
-            <a:xfrm>
-              <a:off x="208963" y="1928559"/>
+              <a:off x="557974" y="1881204"/>
               <a:ext cx="2235240" cy="2038013"/>
             </a:xfrm>
             <a:prstGeom prst="rect">
               <a:avLst/>
             </a:prstGeom>
+            <a:ln>
+              <a:solidFill>
+                <a:schemeClr val="tx2">
+                  <a:lumMod val="75000"/>
+                </a:schemeClr>
+              </a:solidFill>
+            </a:ln>
           </p:spPr>
         </p:pic>
-        <p:sp>
-          <p:nvSpPr>
-            <p:cNvPr id="18" name="ZoneTexte 17">
-              <a:extLst>
-                <a:ext uri="{FF2B5EF4-FFF2-40B4-BE49-F238E27FC236}">
-                  <a16:creationId xmlns:a16="http://schemas.microsoft.com/office/drawing/2014/main" id="{05802896-F058-4601-A8A3-FDFD59C31D2B}"/>
-                </a:ext>
-              </a:extLst>
-            </p:cNvPr>
-            <p:cNvSpPr txBox="1"/>
-            <p:nvPr/>
-          </p:nvSpPr>
-          <p:spPr>
-            <a:xfrm>
-              <a:off x="1153325" y="1163031"/>
-              <a:ext cx="567267" cy="307777"/>
-            </a:xfrm>
-            <a:prstGeom prst="rect">
-              <a:avLst/>
-            </a:prstGeom>
-            <a:noFill/>
-          </p:spPr>
-          <p:txBody>
-            <a:bodyPr wrap="square" rtlCol="0">
-              <a:spAutoFit/>
-            </a:bodyPr>
-            <a:lstStyle/>
-            <a:p>
-              <a:r>
-                <a:rPr lang="fr-FR" sz="1400" b="1" dirty="0">
-                  <a:solidFill>
-                    <a:schemeClr val="accent2">
-                      <a:lumMod val="50000"/>
-                    </a:schemeClr>
-                  </a:solidFill>
-                  <a:effectLst>
-                    <a:outerShdw blurRad="38100" dist="38100" dir="2700000" algn="tl">
-                      <a:srgbClr val="000000">
-                        <a:alpha val="43137"/>
-                      </a:srgbClr>
-                    </a:outerShdw>
-                  </a:effectLst>
-                </a:rPr>
-                <a:t>FRI</a:t>
-              </a:r>
-            </a:p>
-          </p:txBody>
-        </p:sp>
         <p:sp>
           <p:nvSpPr>
             <p:cNvPr id="19" name="ZoneTexte 18">
@@ -4000,13 +3935,16 @@
           </p:nvSpPr>
           <p:spPr>
             <a:xfrm>
-              <a:off x="1234738" y="3105899"/>
+              <a:off x="896077" y="3105899"/>
               <a:ext cx="567267" cy="307777"/>
             </a:xfrm>
             <a:prstGeom prst="rect">
               <a:avLst/>
             </a:prstGeom>
             <a:noFill/>
+            <a:ln>
+              <a:noFill/>
+            </a:ln>
           </p:spPr>
           <p:txBody>
             <a:bodyPr wrap="square" rtlCol="0">
@@ -4055,6 +3993,9 @@
               <a:avLst/>
             </a:prstGeom>
             <a:noFill/>
+            <a:ln>
+              <a:noFill/>
+            </a:ln>
           </p:spPr>
           <p:txBody>
             <a:bodyPr wrap="square" rtlCol="0">
@@ -4082,6 +4023,100 @@
             </a:p>
           </p:txBody>
         </p:sp>
+        <p:pic>
+          <p:nvPicPr>
+            <p:cNvPr id="15" name="Image 14">
+              <a:extLst>
+                <a:ext uri="{FF2B5EF4-FFF2-40B4-BE49-F238E27FC236}">
+                  <a16:creationId xmlns:a16="http://schemas.microsoft.com/office/drawing/2014/main" id="{12078015-9674-4591-ACFD-9841696BCD2D}"/>
+                </a:ext>
+              </a:extLst>
+            </p:cNvPr>
+            <p:cNvPicPr>
+              <a:picLocks noChangeAspect="1"/>
+            </p:cNvPicPr>
+            <p:nvPr/>
+          </p:nvPicPr>
+          <p:blipFill>
+            <a:blip r:embed="rId5">
+              <a:extLst>
+                <a:ext uri="{28A0092B-C50C-407E-A947-70E740481C1C}">
+                  <a14:useLocalDpi xmlns:a14="http://schemas.microsoft.com/office/drawing/2010/main" val="0"/>
+                </a:ext>
+              </a:extLst>
+            </a:blip>
+            <a:stretch>
+              <a:fillRect/>
+            </a:stretch>
+          </p:blipFill>
+          <p:spPr>
+            <a:xfrm>
+              <a:off x="559156" y="341860"/>
+              <a:ext cx="2234058" cy="1718937"/>
+            </a:xfrm>
+            <a:prstGeom prst="rect">
+              <a:avLst/>
+            </a:prstGeom>
+            <a:ln>
+              <a:solidFill>
+                <a:schemeClr val="tx2">
+                  <a:lumMod val="75000"/>
+                </a:schemeClr>
+              </a:solidFill>
+            </a:ln>
+          </p:spPr>
+        </p:pic>
+        <p:sp>
+          <p:nvSpPr>
+            <p:cNvPr id="18" name="ZoneTexte 17">
+              <a:extLst>
+                <a:ext uri="{FF2B5EF4-FFF2-40B4-BE49-F238E27FC236}">
+                  <a16:creationId xmlns:a16="http://schemas.microsoft.com/office/drawing/2014/main" id="{05802896-F058-4601-A8A3-FDFD59C31D2B}"/>
+                </a:ext>
+              </a:extLst>
+            </p:cNvPr>
+            <p:cNvSpPr txBox="1"/>
+            <p:nvPr/>
+          </p:nvSpPr>
+          <p:spPr>
+            <a:xfrm>
+              <a:off x="1603763" y="1148689"/>
+              <a:ext cx="567267" cy="307777"/>
+            </a:xfrm>
+            <a:prstGeom prst="rect">
+              <a:avLst/>
+            </a:prstGeom>
+            <a:noFill/>
+            <a:ln>
+              <a:noFill/>
+            </a:ln>
+          </p:spPr>
+          <p:txBody>
+            <a:bodyPr wrap="square" rtlCol="0">
+              <a:spAutoFit/>
+            </a:bodyPr>
+            <a:lstStyle/>
+            <a:p>
+              <a:r>
+                <a:rPr lang="fr-FR" sz="1400" b="1" dirty="0">
+                  <a:solidFill>
+                    <a:schemeClr val="accent2">
+                      <a:lumMod val="50000"/>
+                    </a:schemeClr>
+                  </a:solidFill>
+                  <a:effectLst>
+                    <a:outerShdw blurRad="38100" dist="38100" dir="2700000" algn="tl">
+                      <a:srgbClr val="000000">
+                        <a:alpha val="43137"/>
+                      </a:srgbClr>
+                    </a:outerShdw>
+                  </a:effectLst>
+                </a:rPr>
+                <a:t>FRI</a:t>
+              </a:r>
+            </a:p>
+          </p:txBody>
+        </p:sp>
       </p:grpSp>
       <p:grpSp>
         <p:nvGrpSpPr>
@@ -4097,10 +4132,10 @@
         </p:nvGrpSpPr>
         <p:grpSpPr>
           <a:xfrm>
-            <a:off x="9643981" y="843119"/>
-            <a:ext cx="2440314" cy="5001087"/>
-            <a:chOff x="9516976" y="1647449"/>
-            <a:chExt cx="2440314" cy="5001087"/>
+            <a:off x="8562789" y="355642"/>
+            <a:ext cx="2459222" cy="4218597"/>
+            <a:chOff x="8643493" y="1972027"/>
+            <a:chExt cx="2459222" cy="4218597"/>
           </a:xfrm>
         </p:grpSpPr>
         <p:pic>
@@ -4119,17 +4154,24 @@
           </p:nvPicPr>
           <p:blipFill rotWithShape="1">
             <a:blip r:embed="rId6"/>
-            <a:srcRect l="14764" r="19383" b="-2094"/>
+            <a:srcRect l="14765" t="5032" r="18872" b="11160"/>
             <a:stretch/>
           </p:blipFill>
           <p:spPr>
             <a:xfrm>
-              <a:off x="9516976" y="4148992"/>
-              <a:ext cx="2440314" cy="2499544"/>
+              <a:off x="8643493" y="4138794"/>
+              <a:ext cx="2459222" cy="2051830"/>
             </a:xfrm>
             <a:prstGeom prst="rect">
               <a:avLst/>
             </a:prstGeom>
+            <a:ln>
+              <a:solidFill>
+                <a:schemeClr val="accent1">
+                  <a:lumMod val="50000"/>
+                </a:schemeClr>
+              </a:solidFill>
+            </a:ln>
           </p:spPr>
         </p:pic>
         <p:pic>
@@ -4148,17 +4190,24 @@
           </p:nvPicPr>
           <p:blipFill rotWithShape="1">
             <a:blip r:embed="rId7"/>
-            <a:srcRect l="11908" t="1739" r="24369" b="3195"/>
+            <a:srcRect l="21562" t="1738" r="34327" b="16106"/>
             <a:stretch/>
           </p:blipFill>
           <p:spPr>
             <a:xfrm>
-              <a:off x="9516976" y="1647449"/>
-              <a:ext cx="2440314" cy="2499544"/>
+              <a:off x="9413445" y="1972027"/>
+              <a:ext cx="1689270" cy="2160082"/>
             </a:xfrm>
             <a:prstGeom prst="rect">
               <a:avLst/>
             </a:prstGeom>
+            <a:ln>
+              <a:solidFill>
+                <a:schemeClr val="accent1">
+                  <a:lumMod val="50000"/>
+                </a:schemeClr>
+              </a:solidFill>
+            </a:ln>
           </p:spPr>
         </p:pic>
         <p:sp>
@@ -4175,13 +4224,16 @@
           </p:nvSpPr>
           <p:spPr>
             <a:xfrm>
-              <a:off x="10133115" y="2793676"/>
+              <a:off x="9684281" y="3087193"/>
               <a:ext cx="567267" cy="307777"/>
             </a:xfrm>
             <a:prstGeom prst="rect">
               <a:avLst/>
             </a:prstGeom>
             <a:noFill/>
+            <a:ln>
+              <a:noFill/>
+            </a:ln>
           </p:spPr>
           <p:txBody>
             <a:bodyPr wrap="square" rtlCol="0">
@@ -4223,13 +4275,16 @@
           </p:nvSpPr>
           <p:spPr>
             <a:xfrm>
-              <a:off x="9996848" y="5309383"/>
+              <a:off x="9202201" y="5350872"/>
               <a:ext cx="567267" cy="307777"/>
             </a:xfrm>
             <a:prstGeom prst="rect">
               <a:avLst/>
             </a:prstGeom>
             <a:noFill/>
+            <a:ln>
+              <a:noFill/>
+            </a:ln>
           </p:spPr>
           <p:txBody>
             <a:bodyPr wrap="square" rtlCol="0">

</xml_diff>